<commit_message>
Downloads-Page removed & software-page preparation
- new credits added (for software-pages)
- language_select: path adjustment (neccessary for software-pages)
- Images added (for software-pages)
- translations added (for software-pages)
</commit_message>
<xml_diff>
--- a/documents/CodeVantis.pptx
+++ b/documents/CodeVantis.pptx
@@ -2947,7 +2947,7 @@
           <a:p>
             <a:fld id="{5D6F7280-8846-4D5C-91D1-686EE7E7F285}" type="datetimeFigureOut">
               <a:rPr lang="de-DE" smtClean="0"/>
-              <a:t>31.03.2025</a:t>
+              <a:t>22.04.2025</a:t>
             </a:fld>
             <a:endParaRPr lang="de-DE"/>
           </a:p>
@@ -3145,7 +3145,7 @@
           <a:p>
             <a:fld id="{5D6F7280-8846-4D5C-91D1-686EE7E7F285}" type="datetimeFigureOut">
               <a:rPr lang="de-DE" smtClean="0"/>
-              <a:t>31.03.2025</a:t>
+              <a:t>22.04.2025</a:t>
             </a:fld>
             <a:endParaRPr lang="de-DE"/>
           </a:p>
@@ -3353,7 +3353,7 @@
           <a:p>
             <a:fld id="{5D6F7280-8846-4D5C-91D1-686EE7E7F285}" type="datetimeFigureOut">
               <a:rPr lang="de-DE" smtClean="0"/>
-              <a:t>31.03.2025</a:t>
+              <a:t>22.04.2025</a:t>
             </a:fld>
             <a:endParaRPr lang="de-DE"/>
           </a:p>
@@ -3551,7 +3551,7 @@
           <a:p>
             <a:fld id="{5D6F7280-8846-4D5C-91D1-686EE7E7F285}" type="datetimeFigureOut">
               <a:rPr lang="de-DE" smtClean="0"/>
-              <a:t>31.03.2025</a:t>
+              <a:t>22.04.2025</a:t>
             </a:fld>
             <a:endParaRPr lang="de-DE"/>
           </a:p>
@@ -3826,7 +3826,7 @@
           <a:p>
             <a:fld id="{5D6F7280-8846-4D5C-91D1-686EE7E7F285}" type="datetimeFigureOut">
               <a:rPr lang="de-DE" smtClean="0"/>
-              <a:t>31.03.2025</a:t>
+              <a:t>22.04.2025</a:t>
             </a:fld>
             <a:endParaRPr lang="de-DE"/>
           </a:p>
@@ -4091,7 +4091,7 @@
           <a:p>
             <a:fld id="{5D6F7280-8846-4D5C-91D1-686EE7E7F285}" type="datetimeFigureOut">
               <a:rPr lang="de-DE" smtClean="0"/>
-              <a:t>31.03.2025</a:t>
+              <a:t>22.04.2025</a:t>
             </a:fld>
             <a:endParaRPr lang="de-DE"/>
           </a:p>
@@ -4503,7 +4503,7 @@
           <a:p>
             <a:fld id="{5D6F7280-8846-4D5C-91D1-686EE7E7F285}" type="datetimeFigureOut">
               <a:rPr lang="de-DE" smtClean="0"/>
-              <a:t>31.03.2025</a:t>
+              <a:t>22.04.2025</a:t>
             </a:fld>
             <a:endParaRPr lang="de-DE"/>
           </a:p>
@@ -4644,7 +4644,7 @@
           <a:p>
             <a:fld id="{5D6F7280-8846-4D5C-91D1-686EE7E7F285}" type="datetimeFigureOut">
               <a:rPr lang="de-DE" smtClean="0"/>
-              <a:t>31.03.2025</a:t>
+              <a:t>22.04.2025</a:t>
             </a:fld>
             <a:endParaRPr lang="de-DE"/>
           </a:p>
@@ -4757,7 +4757,7 @@
           <a:p>
             <a:fld id="{5D6F7280-8846-4D5C-91D1-686EE7E7F285}" type="datetimeFigureOut">
               <a:rPr lang="de-DE" smtClean="0"/>
-              <a:t>31.03.2025</a:t>
+              <a:t>22.04.2025</a:t>
             </a:fld>
             <a:endParaRPr lang="de-DE"/>
           </a:p>
@@ -5068,7 +5068,7 @@
           <a:p>
             <a:fld id="{5D6F7280-8846-4D5C-91D1-686EE7E7F285}" type="datetimeFigureOut">
               <a:rPr lang="de-DE" smtClean="0"/>
-              <a:t>31.03.2025</a:t>
+              <a:t>22.04.2025</a:t>
             </a:fld>
             <a:endParaRPr lang="de-DE"/>
           </a:p>
@@ -5356,7 +5356,7 @@
           <a:p>
             <a:fld id="{5D6F7280-8846-4D5C-91D1-686EE7E7F285}" type="datetimeFigureOut">
               <a:rPr lang="de-DE" smtClean="0"/>
-              <a:t>31.03.2025</a:t>
+              <a:t>22.04.2025</a:t>
             </a:fld>
             <a:endParaRPr lang="de-DE"/>
           </a:p>
@@ -5597,7 +5597,7 @@
           <a:p>
             <a:fld id="{5D6F7280-8846-4D5C-91D1-686EE7E7F285}" type="datetimeFigureOut">
               <a:rPr lang="de-DE" smtClean="0"/>
-              <a:t>31.03.2025</a:t>
+              <a:t>22.04.2025</a:t>
             </a:fld>
             <a:endParaRPr lang="de-DE"/>
           </a:p>
@@ -12190,19 +12190,17 @@
           <p:cNvCxnSpPr>
             <a:cxnSpLocks noGrp="1" noRot="1" noMove="1" noResize="1" noEditPoints="1" noAdjustHandles="1" noChangeArrowheads="1" noChangeShapeType="1"/>
             <a:stCxn id="7" idx="0"/>
-            <a:endCxn id="34" idx="0"/>
+            <a:endCxn id="34" idx="3"/>
           </p:cNvCxnSpPr>
           <p:nvPr/>
         </p:nvCxnSpPr>
         <p:spPr>
           <a:xfrm rot="16200000" flipV="1">
-            <a:off x="4254912" y="-415898"/>
-            <a:ext cx="2027598" cy="5307814"/>
+            <a:off x="4136610" y="1735522"/>
+            <a:ext cx="1408616" cy="1611257"/>
           </a:xfrm>
-          <a:prstGeom prst="bentConnector3">
-            <a:avLst>
-              <a:gd name="adj1" fmla="val 111274"/>
-            </a:avLst>
+          <a:prstGeom prst="bentConnector2">
+            <a:avLst/>
           </a:prstGeom>
           <a:ln w="28575">
             <a:solidFill>
@@ -12229,146 +12227,10 @@
       </p:cxnSp>
       <p:cxnSp>
         <p:nvCxnSpPr>
-          <p:cNvPr id="17" name="thanks -&gt; faq">
+          <p:cNvPr id="35" name="index -&gt; projekt">
             <a:extLst>
               <a:ext uri="{FF2B5EF4-FFF2-40B4-BE49-F238E27FC236}">
-                <a16:creationId xmlns:a16="http://schemas.microsoft.com/office/drawing/2014/main" id="{878DAE92-0D77-E9A0-6F35-002C4EC65302}"/>
-              </a:ext>
-            </a:extLst>
-          </p:cNvPr>
-          <p:cNvCxnSpPr>
-            <a:cxnSpLocks noGrp="1" noRot="1" noMove="1" noResize="1" noEditPoints="1" noAdjustHandles="1" noChangeArrowheads="1" noChangeShapeType="1"/>
-            <a:stCxn id="15" idx="2"/>
-            <a:endCxn id="5" idx="0"/>
-          </p:cNvCxnSpPr>
-          <p:nvPr/>
-        </p:nvCxnSpPr>
-        <p:spPr>
-          <a:xfrm>
-            <a:off x="5449366" y="2449475"/>
-            <a:ext cx="5293713" cy="2763916"/>
-          </a:xfrm>
-          <a:prstGeom prst="straightConnector1">
-            <a:avLst/>
-          </a:prstGeom>
-          <a:ln w="28575">
-            <a:solidFill>
-              <a:srgbClr val="2F3557"/>
-            </a:solidFill>
-            <a:tailEnd type="triangle"/>
-          </a:ln>
-        </p:spPr>
-        <p:style>
-          <a:lnRef idx="2">
-            <a:schemeClr val="accent1"/>
-          </a:lnRef>
-          <a:fillRef idx="0">
-            <a:schemeClr val="accent1"/>
-          </a:fillRef>
-          <a:effectRef idx="1">
-            <a:schemeClr val="accent1"/>
-          </a:effectRef>
-          <a:fontRef idx="minor">
-            <a:schemeClr val="tx1"/>
-          </a:fontRef>
-        </p:style>
-      </p:cxnSp>
-      <p:cxnSp>
-        <p:nvCxnSpPr>
-          <p:cNvPr id="40" name="downloads -&gt; thanks">
-            <a:extLst>
-              <a:ext uri="{FF2B5EF4-FFF2-40B4-BE49-F238E27FC236}">
-                <a16:creationId xmlns:a16="http://schemas.microsoft.com/office/drawing/2014/main" id="{C11FD20D-FCD5-0934-25A1-9C9A0C3425C1}"/>
-              </a:ext>
-            </a:extLst>
-          </p:cNvPr>
-          <p:cNvCxnSpPr>
-            <a:cxnSpLocks noGrp="1" noRot="1" noMove="1" noResize="1" noEditPoints="1" noAdjustHandles="1" noChangeArrowheads="1" noChangeShapeType="1"/>
-            <a:endCxn id="15" idx="2"/>
-          </p:cNvCxnSpPr>
-          <p:nvPr/>
-        </p:nvCxnSpPr>
-        <p:spPr>
-          <a:xfrm flipV="1">
-            <a:off x="5449366" y="2449475"/>
-            <a:ext cx="0" cy="795984"/>
-          </a:xfrm>
-          <a:prstGeom prst="straightConnector1">
-            <a:avLst/>
-          </a:prstGeom>
-          <a:ln w="28575">
-            <a:solidFill>
-              <a:srgbClr val="2F3557"/>
-            </a:solidFill>
-            <a:tailEnd type="triangle"/>
-          </a:ln>
-        </p:spPr>
-        <p:style>
-          <a:lnRef idx="2">
-            <a:schemeClr val="accent1"/>
-          </a:lnRef>
-          <a:fillRef idx="0">
-            <a:schemeClr val="accent1"/>
-          </a:fillRef>
-          <a:effectRef idx="1">
-            <a:schemeClr val="accent1"/>
-          </a:effectRef>
-          <a:fontRef idx="minor">
-            <a:schemeClr val="tx1"/>
-          </a:fontRef>
-        </p:style>
-      </p:cxnSp>
-      <p:cxnSp>
-        <p:nvCxnSpPr>
-          <p:cNvPr id="46" name="downloads -&gt; projekt">
-            <a:extLst>
-              <a:ext uri="{FF2B5EF4-FFF2-40B4-BE49-F238E27FC236}">
-                <a16:creationId xmlns:a16="http://schemas.microsoft.com/office/drawing/2014/main" id="{A0034405-74FB-BBA9-8C3D-02734BD797BF}"/>
-              </a:ext>
-            </a:extLst>
-          </p:cNvPr>
-          <p:cNvCxnSpPr>
-            <a:cxnSpLocks noGrp="1" noRot="1" noMove="1" noResize="1" noEditPoints="1" noAdjustHandles="1" noChangeArrowheads="1" noChangeShapeType="1"/>
-            <a:endCxn id="34" idx="2"/>
-          </p:cNvCxnSpPr>
-          <p:nvPr/>
-        </p:nvCxnSpPr>
-        <p:spPr>
-          <a:xfrm flipH="1" flipV="1">
-            <a:off x="2614804" y="2449476"/>
-            <a:ext cx="2285187" cy="795983"/>
-          </a:xfrm>
-          <a:prstGeom prst="straightConnector1">
-            <a:avLst/>
-          </a:prstGeom>
-          <a:ln w="28575">
-            <a:solidFill>
-              <a:srgbClr val="2F3557"/>
-            </a:solidFill>
-            <a:tailEnd type="triangle"/>
-          </a:ln>
-        </p:spPr>
-        <p:style>
-          <a:lnRef idx="2">
-            <a:schemeClr val="accent1"/>
-          </a:lnRef>
-          <a:fillRef idx="0">
-            <a:schemeClr val="accent1"/>
-          </a:fillRef>
-          <a:effectRef idx="1">
-            <a:schemeClr val="accent1"/>
-          </a:effectRef>
-          <a:fontRef idx="minor">
-            <a:schemeClr val="tx1"/>
-          </a:fontRef>
-        </p:style>
-      </p:cxnSp>
-      <p:cxnSp>
-        <p:nvCxnSpPr>
-          <p:cNvPr id="49" name="projekt -&gt; downloads">
-            <a:extLst>
-              <a:ext uri="{FF2B5EF4-FFF2-40B4-BE49-F238E27FC236}">
-                <a16:creationId xmlns:a16="http://schemas.microsoft.com/office/drawing/2014/main" id="{62BA01A3-5463-5C5C-F5C1-E0CED5F4866F}"/>
+                <a16:creationId xmlns:a16="http://schemas.microsoft.com/office/drawing/2014/main" id="{D346915E-EF1D-BA47-3153-FE2405D23BB6}"/>
               </a:ext>
             </a:extLst>
           </p:cNvPr>
@@ -12378,102 +12240,8 @@
           <p:nvPr/>
         </p:nvCxnSpPr>
         <p:spPr>
-          <a:xfrm>
-            <a:off x="3796748" y="2449475"/>
-            <a:ext cx="1292087" cy="795984"/>
-          </a:xfrm>
-          <a:prstGeom prst="straightConnector1">
-            <a:avLst/>
-          </a:prstGeom>
-          <a:ln w="28575">
-            <a:solidFill>
-              <a:srgbClr val="2F3557"/>
-            </a:solidFill>
-            <a:tailEnd type="triangle"/>
-          </a:ln>
-        </p:spPr>
-        <p:style>
-          <a:lnRef idx="2">
-            <a:schemeClr val="accent1"/>
-          </a:lnRef>
-          <a:fillRef idx="0">
-            <a:schemeClr val="accent1"/>
-          </a:fillRef>
-          <a:effectRef idx="1">
-            <a:schemeClr val="accent1"/>
-          </a:effectRef>
-          <a:fontRef idx="minor">
-            <a:schemeClr val="tx1"/>
-          </a:fontRef>
-        </p:style>
-      </p:cxnSp>
-      <p:cxnSp>
-        <p:nvCxnSpPr>
-          <p:cNvPr id="28" name="index -&gt; downloads">
-            <a:extLst>
-              <a:ext uri="{FF2B5EF4-FFF2-40B4-BE49-F238E27FC236}">
-                <a16:creationId xmlns:a16="http://schemas.microsoft.com/office/drawing/2014/main" id="{F67E7922-B30E-F809-311C-58DC0A54E6AA}"/>
-              </a:ext>
-            </a:extLst>
-          </p:cNvPr>
-          <p:cNvCxnSpPr>
-            <a:cxnSpLocks noGrp="1" noRot="1" noMove="1" noResize="1" noEditPoints="1" noAdjustHandles="1" noChangeArrowheads="1" noChangeShapeType="1"/>
-            <a:stCxn id="3" idx="0"/>
-            <a:endCxn id="14" idx="0"/>
-          </p:cNvCxnSpPr>
-          <p:nvPr/>
-        </p:nvCxnSpPr>
-        <p:spPr>
-          <a:xfrm rot="5400000" flipH="1" flipV="1">
-            <a:off x="3992172" y="1874441"/>
-            <a:ext cx="12700" cy="2754736"/>
-          </a:xfrm>
-          <a:prstGeom prst="bentConnector3">
-            <a:avLst>
-              <a:gd name="adj1" fmla="val 1800000"/>
-            </a:avLst>
-          </a:prstGeom>
-          <a:ln w="28575">
-            <a:solidFill>
-              <a:srgbClr val="2F3557"/>
-            </a:solidFill>
-            <a:tailEnd type="triangle"/>
-          </a:ln>
-        </p:spPr>
-        <p:style>
-          <a:lnRef idx="2">
-            <a:schemeClr val="accent1"/>
-          </a:lnRef>
-          <a:fillRef idx="0">
-            <a:schemeClr val="accent1"/>
-          </a:fillRef>
-          <a:effectRef idx="1">
-            <a:schemeClr val="accent1"/>
-          </a:effectRef>
-          <a:fontRef idx="minor">
-            <a:schemeClr val="tx1"/>
-          </a:fontRef>
-        </p:style>
-      </p:cxnSp>
-      <p:cxnSp>
-        <p:nvCxnSpPr>
-          <p:cNvPr id="35" name="index -&gt; projekt">
-            <a:extLst>
-              <a:ext uri="{FF2B5EF4-FFF2-40B4-BE49-F238E27FC236}">
-                <a16:creationId xmlns:a16="http://schemas.microsoft.com/office/drawing/2014/main" id="{D346915E-EF1D-BA47-3153-FE2405D23BB6}"/>
-              </a:ext>
-            </a:extLst>
-          </p:cNvPr>
-          <p:cNvCxnSpPr>
-            <a:cxnSpLocks noGrp="1" noRot="1" noMove="1" noResize="1" noEditPoints="1" noAdjustHandles="1" noChangeArrowheads="1" noChangeShapeType="1"/>
-            <a:stCxn id="3" idx="0"/>
-            <a:endCxn id="34" idx="2"/>
-          </p:cNvCxnSpPr>
-          <p:nvPr/>
-        </p:nvCxnSpPr>
-        <p:spPr>
           <a:xfrm flipV="1">
-            <a:off x="2614804" y="2449476"/>
+            <a:off x="2515414" y="2449476"/>
             <a:ext cx="0" cy="802333"/>
           </a:xfrm>
           <a:prstGeom prst="straightConnector1">
@@ -12519,12 +12287,12 @@
         </p:nvCxnSpPr>
         <p:spPr>
           <a:xfrm rot="5400000" flipH="1" flipV="1">
-            <a:off x="6633629" y="-767016"/>
-            <a:ext cx="12700" cy="8037650"/>
+            <a:off x="5515779" y="344484"/>
+            <a:ext cx="6350" cy="5808301"/>
           </a:xfrm>
           <a:prstGeom prst="bentConnector3">
             <a:avLst>
-              <a:gd name="adj1" fmla="val 1956528"/>
+              <a:gd name="adj1" fmla="val 3700000"/>
             </a:avLst>
           </a:prstGeom>
           <a:ln w="28575">
@@ -12572,7 +12340,7 @@
           </a:xfrm>
           <a:prstGeom prst="bentConnector4">
             <a:avLst>
-              <a:gd name="adj1" fmla="val -2799"/>
+              <a:gd name="adj1" fmla="val -11895"/>
               <a:gd name="adj2" fmla="val 137314"/>
             </a:avLst>
           </a:prstGeom>
@@ -13175,7 +12943,7 @@
         </p:nvSpPr>
         <p:spPr>
           <a:xfrm>
-            <a:off x="9258731" y="3251809"/>
+            <a:off x="7029382" y="3245459"/>
             <a:ext cx="2787446" cy="1225264"/>
           </a:xfrm>
           <a:prstGeom prst="rect">
@@ -13293,7 +13061,7 @@
         </p:nvSpPr>
         <p:spPr>
           <a:xfrm>
-            <a:off x="6703790" y="3251808"/>
+            <a:off x="4427718" y="3245459"/>
             <a:ext cx="2437655" cy="1225265"/>
           </a:xfrm>
           <a:prstGeom prst="rect">
@@ -13350,95 +13118,6 @@
                 <a:ea typeface="Verdana" panose="020B0604030504040204" pitchFamily="34" charset="0"/>
               </a:rPr>
               <a:t>Coming Soon Countdown, 1 Karte pro News</a:t>
-            </a:r>
-          </a:p>
-        </p:txBody>
-      </p:sp>
-      <p:sp>
-        <p:nvSpPr>
-          <p:cNvPr id="14" name="downloads.html">
-            <a:extLst>
-              <a:ext uri="{FF2B5EF4-FFF2-40B4-BE49-F238E27FC236}">
-                <a16:creationId xmlns:a16="http://schemas.microsoft.com/office/drawing/2014/main" id="{8B6A09CD-E11C-0499-C9B8-3F98C8E93046}"/>
-              </a:ext>
-            </a:extLst>
-          </p:cNvPr>
-          <p:cNvSpPr>
-            <a:spLocks noGrp="1" noRot="1" noMove="1" noResize="1" noEditPoints="1" noAdjustHandles="1" noChangeArrowheads="1" noChangeShapeType="1"/>
-          </p:cNvSpPr>
-          <p:nvPr/>
-        </p:nvSpPr>
-        <p:spPr>
-          <a:xfrm>
-            <a:off x="4150712" y="3251809"/>
-            <a:ext cx="2437655" cy="1225266"/>
-          </a:xfrm>
-          <a:prstGeom prst="rect">
-            <a:avLst/>
-          </a:prstGeom>
-          <a:solidFill>
-            <a:srgbClr val="EFEFEF"/>
-          </a:solidFill>
-          <a:ln>
-            <a:solidFill>
-              <a:srgbClr val="2F3557"/>
-            </a:solidFill>
-          </a:ln>
-        </p:spPr>
-        <p:style>
-          <a:lnRef idx="2">
-            <a:schemeClr val="accent1">
-              <a:shade val="15000"/>
-            </a:schemeClr>
-          </a:lnRef>
-          <a:fillRef idx="1">
-            <a:schemeClr val="accent1"/>
-          </a:fillRef>
-          <a:effectRef idx="0">
-            <a:schemeClr val="accent1"/>
-          </a:effectRef>
-          <a:fontRef idx="minor">
-            <a:schemeClr val="lt1"/>
-          </a:fontRef>
-        </p:style>
-        <p:txBody>
-          <a:bodyPr rtlCol="0" anchor="ctr"/>
-          <a:lstStyle/>
-          <a:p>
-            <a:pPr algn="ctr"/>
-            <a:r>
-              <a:rPr lang="de-DE" b="1" dirty="0">
-                <a:solidFill>
-                  <a:srgbClr val="2F3557"/>
-                </a:solidFill>
-                <a:latin typeface="Verdana" panose="020B0604030504040204" pitchFamily="34" charset="0"/>
-                <a:ea typeface="Verdana" panose="020B0604030504040204" pitchFamily="34" charset="0"/>
-              </a:rPr>
-              <a:t>downloads.html</a:t>
-            </a:r>
-          </a:p>
-          <a:p>
-            <a:r>
-              <a:rPr lang="de-DE" dirty="0">
-                <a:solidFill>
-                  <a:srgbClr val="2F3557"/>
-                </a:solidFill>
-                <a:latin typeface="Verdana" panose="020B0604030504040204" pitchFamily="34" charset="0"/>
-                <a:ea typeface="Verdana" panose="020B0604030504040204" pitchFamily="34" charset="0"/>
-              </a:rPr>
-              <a:t>Karte pro Projekt mit Downloadlink,</a:t>
-            </a:r>
-          </a:p>
-          <a:p>
-            <a:r>
-              <a:rPr lang="de-DE" dirty="0">
-                <a:solidFill>
-                  <a:srgbClr val="2F3557"/>
-                </a:solidFill>
-                <a:latin typeface="Verdana" panose="020B0604030504040204" pitchFamily="34" charset="0"/>
-                <a:ea typeface="Verdana" panose="020B0604030504040204" pitchFamily="34" charset="0"/>
-              </a:rPr>
-              <a:t>Version, Projektinfo</a:t>
             </a:r>
           </a:p>
         </p:txBody>
@@ -13596,95 +13275,6 @@
       </p:sp>
       <p:sp>
         <p:nvSpPr>
-          <p:cNvPr id="15" name="thanks.html">
-            <a:extLst>
-              <a:ext uri="{FF2B5EF4-FFF2-40B4-BE49-F238E27FC236}">
-                <a16:creationId xmlns:a16="http://schemas.microsoft.com/office/drawing/2014/main" id="{DD4D7049-2CEC-77BF-5A42-A6BCAE931E9F}"/>
-              </a:ext>
-            </a:extLst>
-          </p:cNvPr>
-          <p:cNvSpPr>
-            <a:spLocks noGrp="1" noRot="1" noMove="1" noResize="1" noEditPoints="1" noAdjustHandles="1" noChangeArrowheads="1" noChangeShapeType="1"/>
-          </p:cNvSpPr>
-          <p:nvPr/>
-        </p:nvSpPr>
-        <p:spPr>
-          <a:xfrm>
-            <a:off x="4105660" y="1224209"/>
-            <a:ext cx="2687411" cy="1225266"/>
-          </a:xfrm>
-          <a:prstGeom prst="rect">
-            <a:avLst/>
-          </a:prstGeom>
-          <a:solidFill>
-            <a:srgbClr val="EFEFEF"/>
-          </a:solidFill>
-          <a:ln>
-            <a:solidFill>
-              <a:srgbClr val="2F3557"/>
-            </a:solidFill>
-          </a:ln>
-        </p:spPr>
-        <p:style>
-          <a:lnRef idx="2">
-            <a:schemeClr val="accent1">
-              <a:shade val="15000"/>
-            </a:schemeClr>
-          </a:lnRef>
-          <a:fillRef idx="1">
-            <a:schemeClr val="accent1"/>
-          </a:fillRef>
-          <a:effectRef idx="0">
-            <a:schemeClr val="accent1"/>
-          </a:effectRef>
-          <a:fontRef idx="minor">
-            <a:schemeClr val="lt1"/>
-          </a:fontRef>
-        </p:style>
-        <p:txBody>
-          <a:bodyPr rtlCol="0" anchor="ctr"/>
-          <a:lstStyle/>
-          <a:p>
-            <a:pPr algn="ctr"/>
-            <a:r>
-              <a:rPr lang="de-DE" b="1" dirty="0">
-                <a:solidFill>
-                  <a:srgbClr val="2F3557"/>
-                </a:solidFill>
-                <a:latin typeface="Verdana" panose="020B0604030504040204" pitchFamily="34" charset="0"/>
-                <a:ea typeface="Verdana" panose="020B0604030504040204" pitchFamily="34" charset="0"/>
-              </a:rPr>
-              <a:t>thanks.html</a:t>
-            </a:r>
-          </a:p>
-          <a:p>
-            <a:r>
-              <a:rPr lang="de-DE" dirty="0">
-                <a:solidFill>
-                  <a:srgbClr val="2F3557"/>
-                </a:solidFill>
-                <a:latin typeface="Verdana" panose="020B0604030504040204" pitchFamily="34" charset="0"/>
-                <a:ea typeface="Verdana" panose="020B0604030504040204" pitchFamily="34" charset="0"/>
-              </a:rPr>
-              <a:t>Danke für Download</a:t>
-            </a:r>
-          </a:p>
-          <a:p>
-            <a:r>
-              <a:rPr lang="de-DE" dirty="0">
-                <a:solidFill>
-                  <a:srgbClr val="2F3557"/>
-                </a:solidFill>
-                <a:latin typeface="Verdana" panose="020B0604030504040204" pitchFamily="34" charset="0"/>
-                <a:ea typeface="Verdana" panose="020B0604030504040204" pitchFamily="34" charset="0"/>
-              </a:rPr>
-              <a:t>Link zu FAQ + Installationsanleitung</a:t>
-            </a:r>
-          </a:p>
-        </p:txBody>
-      </p:sp>
-      <p:sp>
-        <p:nvSpPr>
           <p:cNvPr id="34" name="projekt.html">
             <a:extLst>
               <a:ext uri="{FF2B5EF4-FFF2-40B4-BE49-F238E27FC236}">
@@ -13755,25 +13345,8 @@
                 <a:latin typeface="Verdana" panose="020B0604030504040204" pitchFamily="34" charset="0"/>
                 <a:ea typeface="Verdana" panose="020B0604030504040204" pitchFamily="34" charset="0"/>
               </a:rPr>
-              <a:t>genaue Beschreibung, Bilder, Versionsverlauf, </a:t>
+              <a:t>genaue Beschreibung, Bilder, Versionsverlauf, Video, Download</a:t>
             </a:r>
-            <a:r>
-              <a:rPr lang="de-DE" dirty="0" err="1">
-                <a:solidFill>
-                  <a:srgbClr val="2F3557"/>
-                </a:solidFill>
-                <a:latin typeface="Verdana" panose="020B0604030504040204" pitchFamily="34" charset="0"/>
-                <a:ea typeface="Verdana" panose="020B0604030504040204" pitchFamily="34" charset="0"/>
-              </a:rPr>
-              <a:t>Changelog</a:t>
-            </a:r>
-            <a:endParaRPr lang="de-DE" dirty="0">
-              <a:solidFill>
-                <a:srgbClr val="2F3557"/>
-              </a:solidFill>
-              <a:latin typeface="Verdana" panose="020B0604030504040204" pitchFamily="34" charset="0"/>
-              <a:ea typeface="Verdana" panose="020B0604030504040204" pitchFamily="34" charset="0"/>
-            </a:endParaRPr>
           </a:p>
         </p:txBody>
       </p:sp>
@@ -14016,7 +13589,7 @@
                                           </p:stCondLst>
                                         </p:cTn>
                                         <p:tgtEl>
-                                          <p:spTgt spid="28"/>
+                                          <p:spTgt spid="57"/>
                                         </p:tgtEl>
                                         <p:attrNameLst>
                                           <p:attrName>style.visibility</p:attrName>
@@ -14029,271 +13602,6 @@
                                     <p:animEffect transition="in" filter="fade">
                                       <p:cBhvr>
                                         <p:cTn id="22" dur="500"/>
-                                        <p:tgtEl>
-                                          <p:spTgt spid="28"/>
-                                        </p:tgtEl>
-                                      </p:cBhvr>
-                                    </p:animEffect>
-                                  </p:childTnLst>
-                                </p:cTn>
-                              </p:par>
-                            </p:childTnLst>
-                          </p:cTn>
-                        </p:par>
-                      </p:childTnLst>
-                    </p:cTn>
-                  </p:par>
-                  <p:par>
-                    <p:cTn id="23" fill="hold">
-                      <p:stCondLst>
-                        <p:cond delay="indefinite"/>
-                      </p:stCondLst>
-                      <p:childTnLst>
-                        <p:par>
-                          <p:cTn id="24" fill="hold">
-                            <p:stCondLst>
-                              <p:cond delay="0"/>
-                            </p:stCondLst>
-                            <p:childTnLst>
-                              <p:par>
-                                <p:cTn id="25" presetID="10" presetClass="entr" presetSubtype="0" fill="hold" nodeType="clickEffect">
-                                  <p:stCondLst>
-                                    <p:cond delay="0"/>
-                                  </p:stCondLst>
-                                  <p:childTnLst>
-                                    <p:set>
-                                      <p:cBhvr>
-                                        <p:cTn id="26" dur="1" fill="hold">
-                                          <p:stCondLst>
-                                            <p:cond delay="0"/>
-                                          </p:stCondLst>
-                                        </p:cTn>
-                                        <p:tgtEl>
-                                          <p:spTgt spid="49"/>
-                                        </p:tgtEl>
-                                        <p:attrNameLst>
-                                          <p:attrName>style.visibility</p:attrName>
-                                        </p:attrNameLst>
-                                      </p:cBhvr>
-                                      <p:to>
-                                        <p:strVal val="visible"/>
-                                      </p:to>
-                                    </p:set>
-                                    <p:animEffect transition="in" filter="fade">
-                                      <p:cBhvr>
-                                        <p:cTn id="27" dur="500"/>
-                                        <p:tgtEl>
-                                          <p:spTgt spid="49"/>
-                                        </p:tgtEl>
-                                      </p:cBhvr>
-                                    </p:animEffect>
-                                  </p:childTnLst>
-                                </p:cTn>
-                              </p:par>
-                            </p:childTnLst>
-                          </p:cTn>
-                        </p:par>
-                      </p:childTnLst>
-                    </p:cTn>
-                  </p:par>
-                  <p:par>
-                    <p:cTn id="28" fill="hold">
-                      <p:stCondLst>
-                        <p:cond delay="indefinite"/>
-                      </p:stCondLst>
-                      <p:childTnLst>
-                        <p:par>
-                          <p:cTn id="29" fill="hold">
-                            <p:stCondLst>
-                              <p:cond delay="0"/>
-                            </p:stCondLst>
-                            <p:childTnLst>
-                              <p:par>
-                                <p:cTn id="30" presetID="10" presetClass="entr" presetSubtype="0" fill="hold" nodeType="clickEffect">
-                                  <p:stCondLst>
-                                    <p:cond delay="0"/>
-                                  </p:stCondLst>
-                                  <p:childTnLst>
-                                    <p:set>
-                                      <p:cBhvr>
-                                        <p:cTn id="31" dur="1" fill="hold">
-                                          <p:stCondLst>
-                                            <p:cond delay="0"/>
-                                          </p:stCondLst>
-                                        </p:cTn>
-                                        <p:tgtEl>
-                                          <p:spTgt spid="46"/>
-                                        </p:tgtEl>
-                                        <p:attrNameLst>
-                                          <p:attrName>style.visibility</p:attrName>
-                                        </p:attrNameLst>
-                                      </p:cBhvr>
-                                      <p:to>
-                                        <p:strVal val="visible"/>
-                                      </p:to>
-                                    </p:set>
-                                    <p:animEffect transition="in" filter="fade">
-                                      <p:cBhvr>
-                                        <p:cTn id="32" dur="500"/>
-                                        <p:tgtEl>
-                                          <p:spTgt spid="46"/>
-                                        </p:tgtEl>
-                                      </p:cBhvr>
-                                    </p:animEffect>
-                                  </p:childTnLst>
-                                </p:cTn>
-                              </p:par>
-                            </p:childTnLst>
-                          </p:cTn>
-                        </p:par>
-                      </p:childTnLst>
-                    </p:cTn>
-                  </p:par>
-                  <p:par>
-                    <p:cTn id="33" fill="hold">
-                      <p:stCondLst>
-                        <p:cond delay="indefinite"/>
-                      </p:stCondLst>
-                      <p:childTnLst>
-                        <p:par>
-                          <p:cTn id="34" fill="hold">
-                            <p:stCondLst>
-                              <p:cond delay="0"/>
-                            </p:stCondLst>
-                            <p:childTnLst>
-                              <p:par>
-                                <p:cTn id="35" presetID="10" presetClass="entr" presetSubtype="0" fill="hold" nodeType="clickEffect">
-                                  <p:stCondLst>
-                                    <p:cond delay="0"/>
-                                  </p:stCondLst>
-                                  <p:childTnLst>
-                                    <p:set>
-                                      <p:cBhvr>
-                                        <p:cTn id="36" dur="1" fill="hold">
-                                          <p:stCondLst>
-                                            <p:cond delay="0"/>
-                                          </p:stCondLst>
-                                        </p:cTn>
-                                        <p:tgtEl>
-                                          <p:spTgt spid="40"/>
-                                        </p:tgtEl>
-                                        <p:attrNameLst>
-                                          <p:attrName>style.visibility</p:attrName>
-                                        </p:attrNameLst>
-                                      </p:cBhvr>
-                                      <p:to>
-                                        <p:strVal val="visible"/>
-                                      </p:to>
-                                    </p:set>
-                                    <p:animEffect transition="in" filter="fade">
-                                      <p:cBhvr>
-                                        <p:cTn id="37" dur="500"/>
-                                        <p:tgtEl>
-                                          <p:spTgt spid="40"/>
-                                        </p:tgtEl>
-                                      </p:cBhvr>
-                                    </p:animEffect>
-                                  </p:childTnLst>
-                                </p:cTn>
-                              </p:par>
-                            </p:childTnLst>
-                          </p:cTn>
-                        </p:par>
-                      </p:childTnLst>
-                    </p:cTn>
-                  </p:par>
-                  <p:par>
-                    <p:cTn id="38" fill="hold">
-                      <p:stCondLst>
-                        <p:cond delay="indefinite"/>
-                      </p:stCondLst>
-                      <p:childTnLst>
-                        <p:par>
-                          <p:cTn id="39" fill="hold">
-                            <p:stCondLst>
-                              <p:cond delay="0"/>
-                            </p:stCondLst>
-                            <p:childTnLst>
-                              <p:par>
-                                <p:cTn id="40" presetID="10" presetClass="entr" presetSubtype="0" fill="hold" nodeType="clickEffect">
-                                  <p:stCondLst>
-                                    <p:cond delay="0"/>
-                                  </p:stCondLst>
-                                  <p:childTnLst>
-                                    <p:set>
-                                      <p:cBhvr>
-                                        <p:cTn id="41" dur="1" fill="hold">
-                                          <p:stCondLst>
-                                            <p:cond delay="0"/>
-                                          </p:stCondLst>
-                                        </p:cTn>
-                                        <p:tgtEl>
-                                          <p:spTgt spid="17"/>
-                                        </p:tgtEl>
-                                        <p:attrNameLst>
-                                          <p:attrName>style.visibility</p:attrName>
-                                        </p:attrNameLst>
-                                      </p:cBhvr>
-                                      <p:to>
-                                        <p:strVal val="visible"/>
-                                      </p:to>
-                                    </p:set>
-                                    <p:animEffect transition="in" filter="fade">
-                                      <p:cBhvr>
-                                        <p:cTn id="42" dur="500"/>
-                                        <p:tgtEl>
-                                          <p:spTgt spid="17"/>
-                                        </p:tgtEl>
-                                      </p:cBhvr>
-                                    </p:animEffect>
-                                  </p:childTnLst>
-                                </p:cTn>
-                              </p:par>
-                            </p:childTnLst>
-                          </p:cTn>
-                        </p:par>
-                      </p:childTnLst>
-                    </p:cTn>
-                  </p:par>
-                  <p:par>
-                    <p:cTn id="43" fill="hold">
-                      <p:stCondLst>
-                        <p:cond delay="indefinite"/>
-                      </p:stCondLst>
-                      <p:childTnLst>
-                        <p:par>
-                          <p:cTn id="44" fill="hold">
-                            <p:stCondLst>
-                              <p:cond delay="0"/>
-                            </p:stCondLst>
-                            <p:childTnLst>
-                              <p:par>
-                                <p:cTn id="45" presetID="10" presetClass="entr" presetSubtype="0" fill="hold" nodeType="clickEffect">
-                                  <p:stCondLst>
-                                    <p:cond delay="0"/>
-                                  </p:stCondLst>
-                                  <p:childTnLst>
-                                    <p:set>
-                                      <p:cBhvr>
-                                        <p:cTn id="46" dur="1" fill="hold">
-                                          <p:stCondLst>
-                                            <p:cond delay="0"/>
-                                          </p:stCondLst>
-                                        </p:cTn>
-                                        <p:tgtEl>
-                                          <p:spTgt spid="57"/>
-                                        </p:tgtEl>
-                                        <p:attrNameLst>
-                                          <p:attrName>style.visibility</p:attrName>
-                                        </p:attrNameLst>
-                                      </p:cBhvr>
-                                      <p:to>
-                                        <p:strVal val="visible"/>
-                                      </p:to>
-                                    </p:set>
-                                    <p:animEffect transition="in" filter="fade">
-                                      <p:cBhvr>
-                                        <p:cTn id="47" dur="500"/>
                                         <p:tgtEl>
                                           <p:spTgt spid="57"/>
                                         </p:tgtEl>

</xml_diff>